<commit_message>
update mid-term report v3
</commit_message>
<xml_diff>
--- a/reports/中期报告.pptx
+++ b/reports/中期报告.pptx
@@ -223,7 +223,7 @@
           <a:p>
             <a:fld id="{9C348D9F-EAA7-4695-AB60-CE4EAC7800FB}" type="datetimeFigureOut">
               <a:rPr lang="zh-CN" altLang="en-US" smtClean="0"/>
-              <a:t>2023/10/24</a:t>
+              <a:t>2023/10/25</a:t>
             </a:fld>
             <a:endParaRPr lang="zh-CN" altLang="en-US"/>
           </a:p>
@@ -1813,7 +1813,7 @@
           <a:p>
             <a:fld id="{DD95A278-A236-40F4-8E80-EFEE71BA2360}" type="datetime1">
               <a:rPr lang="zh-CN" altLang="en-US" smtClean="0"/>
-              <a:t>2023/10/24</a:t>
+              <a:t>2023/10/25</a:t>
             </a:fld>
             <a:endParaRPr lang="zh-CN" altLang="en-US"/>
           </a:p>
@@ -2011,7 +2011,7 @@
           <a:p>
             <a:fld id="{F3C88ACE-F4C2-49B2-B86A-0E5D2D91B56A}" type="datetime1">
               <a:rPr lang="zh-CN" altLang="en-US" smtClean="0"/>
-              <a:t>2023/10/24</a:t>
+              <a:t>2023/10/25</a:t>
             </a:fld>
             <a:endParaRPr lang="zh-CN" altLang="en-US"/>
           </a:p>
@@ -2219,7 +2219,7 @@
           <a:p>
             <a:fld id="{49828DEB-3339-49EB-A5C9-DEB1F9FBC220}" type="datetime1">
               <a:rPr lang="zh-CN" altLang="en-US" smtClean="0"/>
-              <a:t>2023/10/24</a:t>
+              <a:t>2023/10/25</a:t>
             </a:fld>
             <a:endParaRPr lang="zh-CN" altLang="en-US"/>
           </a:p>
@@ -2417,7 +2417,7 @@
           <a:p>
             <a:fld id="{E7914E95-AC62-4DC7-944B-B6BF26B5C84A}" type="datetime1">
               <a:rPr lang="zh-CN" altLang="en-US" smtClean="0"/>
-              <a:t>2023/10/24</a:t>
+              <a:t>2023/10/25</a:t>
             </a:fld>
             <a:endParaRPr lang="zh-CN" altLang="en-US"/>
           </a:p>
@@ -2692,7 +2692,7 @@
           <a:p>
             <a:fld id="{92EF2F5D-C2AF-4978-9C80-82AA34365D34}" type="datetime1">
               <a:rPr lang="zh-CN" altLang="en-US" smtClean="0"/>
-              <a:t>2023/10/24</a:t>
+              <a:t>2023/10/25</a:t>
             </a:fld>
             <a:endParaRPr lang="zh-CN" altLang="en-US"/>
           </a:p>
@@ -2957,7 +2957,7 @@
           <a:p>
             <a:fld id="{7930B8E0-E288-4027-A889-D0FF8399311A}" type="datetime1">
               <a:rPr lang="zh-CN" altLang="en-US" smtClean="0"/>
-              <a:t>2023/10/24</a:t>
+              <a:t>2023/10/25</a:t>
             </a:fld>
             <a:endParaRPr lang="zh-CN" altLang="en-US"/>
           </a:p>
@@ -3369,7 +3369,7 @@
           <a:p>
             <a:fld id="{F6EA9DDB-A148-48EE-9568-79842EBB413F}" type="datetime1">
               <a:rPr lang="zh-CN" altLang="en-US" smtClean="0"/>
-              <a:t>2023/10/24</a:t>
+              <a:t>2023/10/25</a:t>
             </a:fld>
             <a:endParaRPr lang="zh-CN" altLang="en-US"/>
           </a:p>
@@ -3510,7 +3510,7 @@
           <a:p>
             <a:fld id="{8B417621-9690-47B8-BAF5-E83A10ED59FB}" type="datetime1">
               <a:rPr lang="zh-CN" altLang="en-US" smtClean="0"/>
-              <a:t>2023/10/24</a:t>
+              <a:t>2023/10/25</a:t>
             </a:fld>
             <a:endParaRPr lang="zh-CN" altLang="en-US"/>
           </a:p>
@@ -3623,7 +3623,7 @@
           <a:p>
             <a:fld id="{C2BA5D0E-E49C-4448-BC77-1AA0CDC93D53}" type="datetime1">
               <a:rPr lang="zh-CN" altLang="en-US" smtClean="0"/>
-              <a:t>2023/10/24</a:t>
+              <a:t>2023/10/25</a:t>
             </a:fld>
             <a:endParaRPr lang="zh-CN" altLang="en-US"/>
           </a:p>
@@ -3934,7 +3934,7 @@
           <a:p>
             <a:fld id="{5BB16C8C-BEA8-42C0-9B1D-822C6677AEE0}" type="datetime1">
               <a:rPr lang="zh-CN" altLang="en-US" smtClean="0"/>
-              <a:t>2023/10/24</a:t>
+              <a:t>2023/10/25</a:t>
             </a:fld>
             <a:endParaRPr lang="zh-CN" altLang="en-US"/>
           </a:p>
@@ -4222,7 +4222,7 @@
           <a:p>
             <a:fld id="{D5C3D985-C214-46EC-9F93-83B9DCD206A4}" type="datetime1">
               <a:rPr lang="zh-CN" altLang="en-US" smtClean="0"/>
-              <a:t>2023/10/24</a:t>
+              <a:t>2023/10/25</a:t>
             </a:fld>
             <a:endParaRPr lang="zh-CN" altLang="en-US"/>
           </a:p>
@@ -4463,7 +4463,7 @@
           <a:p>
             <a:fld id="{1F6B78BE-9D5F-499A-B960-4AA5AE71D31B}" type="datetime1">
               <a:rPr lang="zh-CN" altLang="en-US" smtClean="0"/>
-              <a:t>2023/10/24</a:t>
+              <a:t>2023/10/25</a:t>
             </a:fld>
             <a:endParaRPr lang="zh-CN" altLang="en-US"/>
           </a:p>
@@ -5196,7 +5196,7 @@
                 <a:latin typeface="微软雅黑" panose="020B0503020204020204" pitchFamily="34" charset="-122"/>
                 <a:ea typeface="微软雅黑" panose="020B0503020204020204" pitchFamily="34" charset="-122"/>
               </a:rPr>
-              <a:t>秒。通过每个的计算次数，测试调度算法的公平性。</a:t>
+              <a:t>秒。通过记录每个进程的计算次数，测试调度算法的公平性。</a:t>
             </a:r>
             <a:endParaRPr lang="en-US" altLang="zh-CN" sz="2000" dirty="0">
               <a:latin typeface="微软雅黑" panose="020B0503020204020204" pitchFamily="34" charset="-122"/>
@@ -6043,28 +6043,7 @@
                 <a:latin typeface="微软雅黑" panose="020B0503020204020204" pitchFamily="34" charset="-122"/>
                 <a:ea typeface="微软雅黑" panose="020B0503020204020204" pitchFamily="34" charset="-122"/>
               </a:rPr>
-              <a:t>：有一定退化为 </a:t>
-            </a:r>
-            <a:r>
-              <a:rPr lang="en-US" altLang="zh-CN" sz="1600" dirty="0" err="1">
-                <a:latin typeface="微软雅黑" panose="020B0503020204020204" pitchFamily="34" charset="-122"/>
-                <a:ea typeface="微软雅黑" panose="020B0503020204020204" pitchFamily="34" charset="-122"/>
-              </a:rPr>
-              <a:t>fifo</a:t>
-            </a:r>
-            <a:r>
-              <a:rPr lang="en-US" altLang="zh-CN" sz="1600" dirty="0">
-                <a:latin typeface="微软雅黑" panose="020B0503020204020204" pitchFamily="34" charset="-122"/>
-                <a:ea typeface="微软雅黑" panose="020B0503020204020204" pitchFamily="34" charset="-122"/>
-              </a:rPr>
-              <a:t> </a:t>
-            </a:r>
-            <a:r>
-              <a:rPr lang="zh-CN" altLang="en-US" sz="1600" dirty="0">
-                <a:latin typeface="微软雅黑" panose="020B0503020204020204" pitchFamily="34" charset="-122"/>
-                <a:ea typeface="微软雅黑" panose="020B0503020204020204" pitchFamily="34" charset="-122"/>
-              </a:rPr>
-              <a:t>的现象</a:t>
+              <a:t>：可以保证一定的公平性</a:t>
             </a:r>
             <a:endParaRPr lang="en-US" altLang="zh-CN" sz="1600" dirty="0">
               <a:latin typeface="微软雅黑" panose="020B0503020204020204" pitchFamily="34" charset="-122"/>
@@ -6139,7 +6118,7 @@
                 <a:latin typeface="微软雅黑" panose="020B0503020204020204" pitchFamily="34" charset="-122"/>
                 <a:ea typeface="微软雅黑" panose="020B0503020204020204" pitchFamily="34" charset="-122"/>
               </a:rPr>
-              <a:t>：出现不完全抢占现象</a:t>
+              <a:t>：出现不完全抢占现象，公平性稍受影响</a:t>
             </a:r>
             <a:endParaRPr lang="en-US" altLang="zh-CN" sz="1600" dirty="0">
               <a:latin typeface="微软雅黑" panose="020B0503020204020204" pitchFamily="34" charset="-122"/>
@@ -8121,7 +8100,7 @@
         </p:nvSpPr>
         <p:spPr>
           <a:xfrm>
-            <a:off x="722586" y="1045725"/>
+            <a:off x="722586" y="725173"/>
             <a:ext cx="10515600" cy="1009047"/>
           </a:xfrm>
         </p:spPr>
@@ -8260,7 +8239,7 @@
                 <a:latin typeface="微软雅黑" panose="020B0503020204020204" pitchFamily="34" charset="-122"/>
                 <a:ea typeface="微软雅黑" panose="020B0503020204020204" pitchFamily="34" charset="-122"/>
               </a:rPr>
-              <a:t>。</a:t>
+              <a:t>。用于测试调度算法的实时性。</a:t>
             </a:r>
             <a:endParaRPr lang="en-US" altLang="zh-CN" sz="2000" dirty="0">
               <a:latin typeface="微软雅黑" panose="020B0503020204020204" pitchFamily="34" charset="-122"/>
@@ -8363,13 +8342,13 @@
           <p:nvPr>
             <p:extLst>
               <p:ext uri="{D42A27DB-BD31-4B8C-83A1-F6EECF244321}">
-                <p14:modId xmlns:p14="http://schemas.microsoft.com/office/powerpoint/2010/main" val="3751588798"/>
+                <p14:modId xmlns:p14="http://schemas.microsoft.com/office/powerpoint/2010/main" val="2197795369"/>
               </p:ext>
             </p:extLst>
           </p:nvPr>
         </p:nvGraphicFramePr>
         <p:xfrm>
-          <a:off x="1848942" y="2146045"/>
+          <a:off x="1848942" y="2277424"/>
           <a:ext cx="8262888" cy="2468880"/>
         </p:xfrm>
         <a:graphic>
@@ -9513,7 +9492,7 @@
                 <a:latin typeface="微软雅黑" panose="020B0503020204020204" pitchFamily="34" charset="-122"/>
                 <a:ea typeface="微软雅黑" panose="020B0503020204020204" pitchFamily="34" charset="-122"/>
               </a:rPr>
-              <a:t>：有 </a:t>
+              <a:t>：</a:t>
             </a:r>
             <a:r>
               <a:rPr lang="en-US" altLang="zh-CN" sz="2000" dirty="0">
@@ -9527,13 +9506,27 @@
                 <a:latin typeface="微软雅黑" panose="020B0503020204020204" pitchFamily="34" charset="-122"/>
                 <a:ea typeface="微软雅黑" panose="020B0503020204020204" pitchFamily="34" charset="-122"/>
               </a:rPr>
-              <a:t>个短进程，运行很多次；有一个长进程，运行 </a:t>
+              <a:t>个短进程，运行饱和次；</a:t>
             </a:r>
             <a:r>
               <a:rPr lang="en-US" altLang="zh-CN" sz="2000" dirty="0">
                 <a:latin typeface="微软雅黑" panose="020B0503020204020204" pitchFamily="34" charset="-122"/>
                 <a:ea typeface="微软雅黑" panose="020B0503020204020204" pitchFamily="34" charset="-122"/>
               </a:rPr>
+              <a:t>1</a:t>
+            </a:r>
+            <a:r>
+              <a:rPr lang="zh-CN" altLang="en-US" sz="2000" dirty="0">
+                <a:latin typeface="微软雅黑" panose="020B0503020204020204" pitchFamily="34" charset="-122"/>
+                <a:ea typeface="微软雅黑" panose="020B0503020204020204" pitchFamily="34" charset="-122"/>
+              </a:rPr>
+              <a:t> 个长进程，运行 </a:t>
+            </a:r>
+            <a:r>
+              <a:rPr lang="en-US" altLang="zh-CN" sz="2000" dirty="0">
+                <a:latin typeface="微软雅黑" panose="020B0503020204020204" pitchFamily="34" charset="-122"/>
+                <a:ea typeface="微软雅黑" panose="020B0503020204020204" pitchFamily="34" charset="-122"/>
+              </a:rPr>
               <a:t>80 </a:t>
             </a:r>
             <a:r>
@@ -9541,7 +9534,7 @@
                 <a:latin typeface="微软雅黑" panose="020B0503020204020204" pitchFamily="34" charset="-122"/>
                 <a:ea typeface="微软雅黑" panose="020B0503020204020204" pitchFamily="34" charset="-122"/>
               </a:rPr>
-              <a:t>次，每次 </a:t>
+              <a:t>次，每次循环长度为 </a:t>
             </a:r>
             <a:r>
               <a:rPr lang="en-US" altLang="zh-CN" sz="2000" dirty="0">
@@ -9555,7 +9548,7 @@
                 <a:latin typeface="微软雅黑" panose="020B0503020204020204" pitchFamily="34" charset="-122"/>
                 <a:ea typeface="微软雅黑" panose="020B0503020204020204" pitchFamily="34" charset="-122"/>
               </a:rPr>
-              <a:t>长度的循环。测试长进程什么时候结束，反映在有实时任务的情况下的响应时间。</a:t>
+              <a:t>。测试长进程的完成时间，反映在有实时任务的情况下的响应时间。</a:t>
             </a:r>
             <a:endParaRPr lang="en-US" altLang="zh-CN" sz="2000" dirty="0">
               <a:latin typeface="微软雅黑" panose="020B0503020204020204" pitchFamily="34" charset="-122"/>
@@ -9658,7 +9651,7 @@
           <p:nvPr>
             <p:extLst>
               <p:ext uri="{D42A27DB-BD31-4B8C-83A1-F6EECF244321}">
-                <p14:modId xmlns:p14="http://schemas.microsoft.com/office/powerpoint/2010/main" val="2823221952"/>
+                <p14:modId xmlns:p14="http://schemas.microsoft.com/office/powerpoint/2010/main" val="1973985493"/>
               </p:ext>
             </p:extLst>
           </p:nvPr>
@@ -9756,7 +9749,7 @@
                       <a:pPr algn="ctr"/>
                       <a:r>
                         <a:rPr lang="en-US" altLang="zh-CN" dirty="0"/>
-                        <a:t>2023</a:t>
+                        <a:t>2649</a:t>
                       </a:r>
                       <a:endParaRPr lang="zh-CN" altLang="en-US" dirty="0"/>
                     </a:p>
@@ -9793,7 +9786,7 @@
                       <a:pPr algn="ctr"/>
                       <a:r>
                         <a:rPr lang="en-US" altLang="zh-CN" dirty="0"/>
-                        <a:t>2019</a:t>
+                        <a:t>2231</a:t>
                       </a:r>
                       <a:endParaRPr lang="zh-CN" altLang="en-US" dirty="0"/>
                     </a:p>
@@ -9830,7 +9823,7 @@
                       <a:pPr algn="ctr"/>
                       <a:r>
                         <a:rPr lang="en-US" altLang="zh-CN" dirty="0"/>
-                        <a:t>4828</a:t>
+                        <a:t>4748</a:t>
                       </a:r>
                       <a:endParaRPr lang="zh-CN" altLang="en-US" dirty="0"/>
                     </a:p>
@@ -10214,16 +10207,30 @@
                 <a:latin typeface="微软雅黑" panose="020B0503020204020204" pitchFamily="34" charset="-122"/>
                 <a:ea typeface="微软雅黑" panose="020B0503020204020204" pitchFamily="34" charset="-122"/>
               </a:rPr>
-              <a:t>响应时间长。</a:t>
-            </a:r>
-            <a:r>
-              <a:rPr lang="zh-CN" altLang="en-US" sz="1600" dirty="0">
-                <a:latin typeface="微软雅黑" panose="020B0503020204020204" pitchFamily="34" charset="-122"/>
-                <a:ea typeface="微软雅黑" panose="020B0503020204020204" pitchFamily="34" charset="-122"/>
-              </a:rPr>
-              <a:t>。</a:t>
-            </a:r>
-            <a:endParaRPr lang="en-US" altLang="zh-CN" sz="1600" dirty="0">
+              <a:t>和 </a:t>
+            </a:r>
+            <a:r>
+              <a:rPr lang="en-US" altLang="zh-CN" sz="2000" dirty="0" err="1">
+                <a:latin typeface="微软雅黑" panose="020B0503020204020204" pitchFamily="34" charset="-122"/>
+                <a:ea typeface="微软雅黑" panose="020B0503020204020204" pitchFamily="34" charset="-122"/>
+              </a:rPr>
+              <a:t>mlfq</a:t>
+            </a:r>
+            <a:r>
+              <a:rPr lang="en-US" altLang="zh-CN" sz="2000" dirty="0">
+                <a:latin typeface="微软雅黑" panose="020B0503020204020204" pitchFamily="34" charset="-122"/>
+                <a:ea typeface="微软雅黑" panose="020B0503020204020204" pitchFamily="34" charset="-122"/>
+              </a:rPr>
+              <a:t> </a:t>
+            </a:r>
+            <a:r>
+              <a:rPr lang="zh-CN" altLang="en-US" sz="2000" dirty="0">
+                <a:latin typeface="微软雅黑" panose="020B0503020204020204" pitchFamily="34" charset="-122"/>
+                <a:ea typeface="微软雅黑" panose="020B0503020204020204" pitchFamily="34" charset="-122"/>
+              </a:rPr>
+              <a:t>响应时间长（具体顺序受到其它因素如时间片大小等的影响）。</a:t>
+            </a:r>
+            <a:endParaRPr lang="en-US" altLang="zh-CN" sz="2000" dirty="0">
               <a:latin typeface="微软雅黑" panose="020B0503020204020204" pitchFamily="34" charset="-122"/>
               <a:ea typeface="微软雅黑" panose="020B0503020204020204" pitchFamily="34" charset="-122"/>
             </a:endParaRPr>
@@ -11814,7 +11821,7 @@
                 <a:latin typeface="微软雅黑" panose="020B0503020204020204" pitchFamily="34" charset="-122"/>
                 <a:ea typeface="微软雅黑" panose="020B0503020204020204" pitchFamily="34" charset="-122"/>
               </a:rPr>
-              <a:t>），执行时出队，新加入或让出时入队</a:t>
+              <a:t>），执行时出队，让出时入队</a:t>
             </a:r>
             <a:endParaRPr lang="en-US" altLang="zh-CN" sz="2000" dirty="0">
               <a:latin typeface="微软雅黑" panose="020B0503020204020204" pitchFamily="34" charset="-122"/>
@@ -13355,7 +13362,7 @@
                 <a:latin typeface="微软雅黑" panose="020B0503020204020204" pitchFamily="34" charset="-122"/>
                 <a:ea typeface="微软雅黑" panose="020B0503020204020204" pitchFamily="34" charset="-122"/>
               </a:rPr>
-              <a:t>个时间片，过 </a:t>
+              <a:t>个时间片，其余队列时间片数指数增长，过 </a:t>
             </a:r>
             <a:r>
               <a:rPr lang="en-US" altLang="zh-CN" sz="2000" dirty="0">
@@ -13369,7 +13376,14 @@
                 <a:latin typeface="微软雅黑" panose="020B0503020204020204" pitchFamily="34" charset="-122"/>
                 <a:ea typeface="微软雅黑" panose="020B0503020204020204" pitchFamily="34" charset="-122"/>
               </a:rPr>
-              <a:t>个时间片重置队列。同优先级抢占式调度。</a:t>
+              <a:t>个时间片</a:t>
+            </a:r>
+            <a:r>
+              <a:rPr lang="zh-CN" altLang="en-US" sz="2000">
+                <a:latin typeface="微软雅黑" panose="020B0503020204020204" pitchFamily="34" charset="-122"/>
+                <a:ea typeface="微软雅黑" panose="020B0503020204020204" pitchFamily="34" charset="-122"/>
+              </a:rPr>
+              <a:t>重置队列。</a:t>
             </a:r>
             <a:endParaRPr lang="en-US" altLang="zh-CN" sz="2000" dirty="0">
               <a:latin typeface="微软雅黑" panose="020B0503020204020204" pitchFamily="34" charset="-122"/>
@@ -13655,7 +13669,7 @@
                 <a:latin typeface="微软雅黑" panose="020B0503020204020204" pitchFamily="34" charset="-122"/>
                 <a:ea typeface="微软雅黑" panose="020B0503020204020204" pitchFamily="34" charset="-122"/>
               </a:rPr>
-              <a:t>注：以下均为单核测试结果，多核测试结果预计于期末报告给出</a:t>
+              <a:t>注：以下均为单核测试结果，多核测试结果将于期末报告给出</a:t>
             </a:r>
             <a:endParaRPr lang="en-US" altLang="zh-CN" sz="2000" dirty="0">
               <a:latin typeface="微软雅黑" panose="020B0503020204020204" pitchFamily="34" charset="-122"/>

</xml_diff>